<commit_message>
Added Other Pages and Basic Charts
</commit_message>
<xml_diff>
--- a/Power_BI_Project_Assignments/Adidas_Sales_Analytics/Design.pptx
+++ b/Power_BI_Project_Assignments/Adidas_Sales_Analytics/Design.pptx
@@ -4,8 +4,13 @@
   <p:sldMasterIdLst>
     <p:sldMasterId id="2147483648" r:id="rId1"/>
   </p:sldMasterIdLst>
+  <p:notesMasterIdLst>
+    <p:notesMasterId r:id="rId5"/>
+  </p:notesMasterIdLst>
   <p:sldIdLst>
     <p:sldId id="256" r:id="rId2"/>
+    <p:sldId id="257" r:id="rId3"/>
+    <p:sldId id="258" r:id="rId4"/>
   </p:sldIdLst>
   <p:sldSz cx="12192000" cy="6858000"/>
   <p:notesSz cx="6858000" cy="9144000"/>
@@ -104,7 +109,446 @@
       </a:defRPr>
     </a:lvl9pPr>
   </p:defaultTextStyle>
+  <p:extLst>
+    <p:ext uri="{EFAFB233-063F-42B5-8137-9DF3F51BA10A}">
+      <p15:sldGuideLst xmlns:p15="http://schemas.microsoft.com/office/powerpoint/2012/main"/>
+    </p:ext>
+  </p:extLst>
 </p:presentation>
+</file>
+
+<file path=ppt/notesMasters/notesMaster1.xml><?xml version="1.0" encoding="utf-8"?>
+<p:notesMaster xmlns:a="http://schemas.openxmlformats.org/drawingml/2006/main" xmlns:r="http://schemas.openxmlformats.org/officeDocument/2006/relationships" xmlns:p="http://schemas.openxmlformats.org/presentationml/2006/main">
+  <p:cSld>
+    <p:bg>
+      <p:bgRef idx="1001">
+        <a:schemeClr val="bg1"/>
+      </p:bgRef>
+    </p:bg>
+    <p:spTree>
+      <p:nvGrpSpPr>
+        <p:cNvPr id="1" name=""/>
+        <p:cNvGrpSpPr/>
+        <p:nvPr/>
+      </p:nvGrpSpPr>
+      <p:grpSpPr>
+        <a:xfrm>
+          <a:off x="0" y="0"/>
+          <a:ext cx="0" cy="0"/>
+          <a:chOff x="0" y="0"/>
+          <a:chExt cx="0" cy="0"/>
+        </a:xfrm>
+      </p:grpSpPr>
+      <p:sp>
+        <p:nvSpPr>
+          <p:cNvPr id="2" name="Header Placeholder 1"/>
+          <p:cNvSpPr>
+            <a:spLocks noGrp="1"/>
+          </p:cNvSpPr>
+          <p:nvPr>
+            <p:ph type="hdr" sz="quarter"/>
+          </p:nvPr>
+        </p:nvSpPr>
+        <p:spPr>
+          <a:xfrm>
+            <a:off x="0" y="0"/>
+            <a:ext cx="2971800" cy="458788"/>
+          </a:xfrm>
+          <a:prstGeom prst="rect">
+            <a:avLst/>
+          </a:prstGeom>
+        </p:spPr>
+        <p:txBody>
+          <a:bodyPr vert="horz" lIns="91440" tIns="45720" rIns="91440" bIns="45720" rtlCol="0"/>
+          <a:lstStyle>
+            <a:lvl1pPr algn="l">
+              <a:defRPr sz="1200"/>
+            </a:lvl1pPr>
+          </a:lstStyle>
+          <a:p>
+            <a:endParaRPr lang="en-IN"/>
+          </a:p>
+        </p:txBody>
+      </p:sp>
+      <p:sp>
+        <p:nvSpPr>
+          <p:cNvPr id="3" name="Date Placeholder 2"/>
+          <p:cNvSpPr>
+            <a:spLocks noGrp="1"/>
+          </p:cNvSpPr>
+          <p:nvPr>
+            <p:ph type="dt" idx="1"/>
+          </p:nvPr>
+        </p:nvSpPr>
+        <p:spPr>
+          <a:xfrm>
+            <a:off x="3884613" y="0"/>
+            <a:ext cx="2971800" cy="458788"/>
+          </a:xfrm>
+          <a:prstGeom prst="rect">
+            <a:avLst/>
+          </a:prstGeom>
+        </p:spPr>
+        <p:txBody>
+          <a:bodyPr vert="horz" lIns="91440" tIns="45720" rIns="91440" bIns="45720" rtlCol="0"/>
+          <a:lstStyle>
+            <a:lvl1pPr algn="r">
+              <a:defRPr sz="1200"/>
+            </a:lvl1pPr>
+          </a:lstStyle>
+          <a:p>
+            <a:fld id="{31D7446F-E600-456D-B628-BDA5524B69E8}" type="datetimeFigureOut">
+              <a:rPr lang="en-IN" smtClean="0"/>
+              <a:t>09-11-2022</a:t>
+            </a:fld>
+            <a:endParaRPr lang="en-IN"/>
+          </a:p>
+        </p:txBody>
+      </p:sp>
+      <p:sp>
+        <p:nvSpPr>
+          <p:cNvPr id="4" name="Slide Image Placeholder 3"/>
+          <p:cNvSpPr>
+            <a:spLocks noGrp="1" noRot="1" noChangeAspect="1"/>
+          </p:cNvSpPr>
+          <p:nvPr>
+            <p:ph type="sldImg" idx="2"/>
+          </p:nvPr>
+        </p:nvSpPr>
+        <p:spPr>
+          <a:xfrm>
+            <a:off x="685800" y="1143000"/>
+            <a:ext cx="5486400" cy="3086100"/>
+          </a:xfrm>
+          <a:prstGeom prst="rect">
+            <a:avLst/>
+          </a:prstGeom>
+          <a:noFill/>
+          <a:ln w="12700">
+            <a:solidFill>
+              <a:prstClr val="black"/>
+            </a:solidFill>
+          </a:ln>
+        </p:spPr>
+        <p:txBody>
+          <a:bodyPr vert="horz" lIns="91440" tIns="45720" rIns="91440" bIns="45720" rtlCol="0" anchor="ctr"/>
+          <a:lstStyle/>
+          <a:p>
+            <a:endParaRPr lang="en-IN"/>
+          </a:p>
+        </p:txBody>
+      </p:sp>
+      <p:sp>
+        <p:nvSpPr>
+          <p:cNvPr id="5" name="Notes Placeholder 4"/>
+          <p:cNvSpPr>
+            <a:spLocks noGrp="1"/>
+          </p:cNvSpPr>
+          <p:nvPr>
+            <p:ph type="body" sz="quarter" idx="3"/>
+          </p:nvPr>
+        </p:nvSpPr>
+        <p:spPr>
+          <a:xfrm>
+            <a:off x="685800" y="4400550"/>
+            <a:ext cx="5486400" cy="3600450"/>
+          </a:xfrm>
+          <a:prstGeom prst="rect">
+            <a:avLst/>
+          </a:prstGeom>
+        </p:spPr>
+        <p:txBody>
+          <a:bodyPr vert="horz" lIns="91440" tIns="45720" rIns="91440" bIns="45720" rtlCol="0"/>
+          <a:lstStyle/>
+          <a:p>
+            <a:pPr lvl="0"/>
+            <a:r>
+              <a:rPr lang="en-US"/>
+              <a:t>Click to edit Master text styles</a:t>
+            </a:r>
+          </a:p>
+          <a:p>
+            <a:pPr lvl="1"/>
+            <a:r>
+              <a:rPr lang="en-US"/>
+              <a:t>Second level</a:t>
+            </a:r>
+          </a:p>
+          <a:p>
+            <a:pPr lvl="2"/>
+            <a:r>
+              <a:rPr lang="en-US"/>
+              <a:t>Third level</a:t>
+            </a:r>
+          </a:p>
+          <a:p>
+            <a:pPr lvl="3"/>
+            <a:r>
+              <a:rPr lang="en-US"/>
+              <a:t>Fourth level</a:t>
+            </a:r>
+          </a:p>
+          <a:p>
+            <a:pPr lvl="4"/>
+            <a:r>
+              <a:rPr lang="en-US"/>
+              <a:t>Fifth level</a:t>
+            </a:r>
+            <a:endParaRPr lang="en-IN"/>
+          </a:p>
+        </p:txBody>
+      </p:sp>
+      <p:sp>
+        <p:nvSpPr>
+          <p:cNvPr id="6" name="Footer Placeholder 5"/>
+          <p:cNvSpPr>
+            <a:spLocks noGrp="1"/>
+          </p:cNvSpPr>
+          <p:nvPr>
+            <p:ph type="ftr" sz="quarter" idx="4"/>
+          </p:nvPr>
+        </p:nvSpPr>
+        <p:spPr>
+          <a:xfrm>
+            <a:off x="0" y="8685213"/>
+            <a:ext cx="2971800" cy="458787"/>
+          </a:xfrm>
+          <a:prstGeom prst="rect">
+            <a:avLst/>
+          </a:prstGeom>
+        </p:spPr>
+        <p:txBody>
+          <a:bodyPr vert="horz" lIns="91440" tIns="45720" rIns="91440" bIns="45720" rtlCol="0" anchor="b"/>
+          <a:lstStyle>
+            <a:lvl1pPr algn="l">
+              <a:defRPr sz="1200"/>
+            </a:lvl1pPr>
+          </a:lstStyle>
+          <a:p>
+            <a:endParaRPr lang="en-IN"/>
+          </a:p>
+        </p:txBody>
+      </p:sp>
+      <p:sp>
+        <p:nvSpPr>
+          <p:cNvPr id="7" name="Slide Number Placeholder 6"/>
+          <p:cNvSpPr>
+            <a:spLocks noGrp="1"/>
+          </p:cNvSpPr>
+          <p:nvPr>
+            <p:ph type="sldNum" sz="quarter" idx="5"/>
+          </p:nvPr>
+        </p:nvSpPr>
+        <p:spPr>
+          <a:xfrm>
+            <a:off x="3884613" y="8685213"/>
+            <a:ext cx="2971800" cy="458787"/>
+          </a:xfrm>
+          <a:prstGeom prst="rect">
+            <a:avLst/>
+          </a:prstGeom>
+        </p:spPr>
+        <p:txBody>
+          <a:bodyPr vert="horz" lIns="91440" tIns="45720" rIns="91440" bIns="45720" rtlCol="0" anchor="b"/>
+          <a:lstStyle>
+            <a:lvl1pPr algn="r">
+              <a:defRPr sz="1200"/>
+            </a:lvl1pPr>
+          </a:lstStyle>
+          <a:p>
+            <a:fld id="{FDC9E0E7-D79D-4812-B544-30E430059E4A}" type="slidenum">
+              <a:rPr lang="en-IN" smtClean="0"/>
+              <a:t>‹#›</a:t>
+            </a:fld>
+            <a:endParaRPr lang="en-IN"/>
+          </a:p>
+        </p:txBody>
+      </p:sp>
+    </p:spTree>
+    <p:extLst>
+      <p:ext uri="{BB962C8B-B14F-4D97-AF65-F5344CB8AC3E}">
+        <p14:creationId xmlns:p14="http://schemas.microsoft.com/office/powerpoint/2010/main" val="2033709670"/>
+      </p:ext>
+    </p:extLst>
+  </p:cSld>
+  <p:clrMap bg1="lt1" tx1="dk1" bg2="lt2" tx2="dk2" accent1="accent1" accent2="accent2" accent3="accent3" accent4="accent4" accent5="accent5" accent6="accent6" hlink="hlink" folHlink="folHlink"/>
+  <p:notesStyle>
+    <a:lvl1pPr marL="0" algn="l" defTabSz="914400" rtl="0" eaLnBrk="1" latinLnBrk="0" hangingPunct="1">
+      <a:defRPr sz="1200" kern="1200">
+        <a:solidFill>
+          <a:schemeClr val="tx1"/>
+        </a:solidFill>
+        <a:latin typeface="+mn-lt"/>
+        <a:ea typeface="+mn-ea"/>
+        <a:cs typeface="+mn-cs"/>
+      </a:defRPr>
+    </a:lvl1pPr>
+    <a:lvl2pPr marL="457200" algn="l" defTabSz="914400" rtl="0" eaLnBrk="1" latinLnBrk="0" hangingPunct="1">
+      <a:defRPr sz="1200" kern="1200">
+        <a:solidFill>
+          <a:schemeClr val="tx1"/>
+        </a:solidFill>
+        <a:latin typeface="+mn-lt"/>
+        <a:ea typeface="+mn-ea"/>
+        <a:cs typeface="+mn-cs"/>
+      </a:defRPr>
+    </a:lvl2pPr>
+    <a:lvl3pPr marL="914400" algn="l" defTabSz="914400" rtl="0" eaLnBrk="1" latinLnBrk="0" hangingPunct="1">
+      <a:defRPr sz="1200" kern="1200">
+        <a:solidFill>
+          <a:schemeClr val="tx1"/>
+        </a:solidFill>
+        <a:latin typeface="+mn-lt"/>
+        <a:ea typeface="+mn-ea"/>
+        <a:cs typeface="+mn-cs"/>
+      </a:defRPr>
+    </a:lvl3pPr>
+    <a:lvl4pPr marL="1371600" algn="l" defTabSz="914400" rtl="0" eaLnBrk="1" latinLnBrk="0" hangingPunct="1">
+      <a:defRPr sz="1200" kern="1200">
+        <a:solidFill>
+          <a:schemeClr val="tx1"/>
+        </a:solidFill>
+        <a:latin typeface="+mn-lt"/>
+        <a:ea typeface="+mn-ea"/>
+        <a:cs typeface="+mn-cs"/>
+      </a:defRPr>
+    </a:lvl4pPr>
+    <a:lvl5pPr marL="1828800" algn="l" defTabSz="914400" rtl="0" eaLnBrk="1" latinLnBrk="0" hangingPunct="1">
+      <a:defRPr sz="1200" kern="1200">
+        <a:solidFill>
+          <a:schemeClr val="tx1"/>
+        </a:solidFill>
+        <a:latin typeface="+mn-lt"/>
+        <a:ea typeface="+mn-ea"/>
+        <a:cs typeface="+mn-cs"/>
+      </a:defRPr>
+    </a:lvl5pPr>
+    <a:lvl6pPr marL="2286000" algn="l" defTabSz="914400" rtl="0" eaLnBrk="1" latinLnBrk="0" hangingPunct="1">
+      <a:defRPr sz="1200" kern="1200">
+        <a:solidFill>
+          <a:schemeClr val="tx1"/>
+        </a:solidFill>
+        <a:latin typeface="+mn-lt"/>
+        <a:ea typeface="+mn-ea"/>
+        <a:cs typeface="+mn-cs"/>
+      </a:defRPr>
+    </a:lvl6pPr>
+    <a:lvl7pPr marL="2743200" algn="l" defTabSz="914400" rtl="0" eaLnBrk="1" latinLnBrk="0" hangingPunct="1">
+      <a:defRPr sz="1200" kern="1200">
+        <a:solidFill>
+          <a:schemeClr val="tx1"/>
+        </a:solidFill>
+        <a:latin typeface="+mn-lt"/>
+        <a:ea typeface="+mn-ea"/>
+        <a:cs typeface="+mn-cs"/>
+      </a:defRPr>
+    </a:lvl7pPr>
+    <a:lvl8pPr marL="3200400" algn="l" defTabSz="914400" rtl="0" eaLnBrk="1" latinLnBrk="0" hangingPunct="1">
+      <a:defRPr sz="1200" kern="1200">
+        <a:solidFill>
+          <a:schemeClr val="tx1"/>
+        </a:solidFill>
+        <a:latin typeface="+mn-lt"/>
+        <a:ea typeface="+mn-ea"/>
+        <a:cs typeface="+mn-cs"/>
+      </a:defRPr>
+    </a:lvl8pPr>
+    <a:lvl9pPr marL="3657600" algn="l" defTabSz="914400" rtl="0" eaLnBrk="1" latinLnBrk="0" hangingPunct="1">
+      <a:defRPr sz="1200" kern="1200">
+        <a:solidFill>
+          <a:schemeClr val="tx1"/>
+        </a:solidFill>
+        <a:latin typeface="+mn-lt"/>
+        <a:ea typeface="+mn-ea"/>
+        <a:cs typeface="+mn-cs"/>
+      </a:defRPr>
+    </a:lvl9pPr>
+  </p:notesStyle>
+</p:notesMaster>
+</file>
+
+<file path=ppt/notesSlides/notesSlide1.xml><?xml version="1.0" encoding="utf-8"?>
+<p:notes xmlns:a="http://schemas.openxmlformats.org/drawingml/2006/main" xmlns:r="http://schemas.openxmlformats.org/officeDocument/2006/relationships" xmlns:p="http://schemas.openxmlformats.org/presentationml/2006/main">
+  <p:cSld>
+    <p:spTree>
+      <p:nvGrpSpPr>
+        <p:cNvPr id="1" name=""/>
+        <p:cNvGrpSpPr/>
+        <p:nvPr/>
+      </p:nvGrpSpPr>
+      <p:grpSpPr>
+        <a:xfrm>
+          <a:off x="0" y="0"/>
+          <a:ext cx="0" cy="0"/>
+          <a:chOff x="0" y="0"/>
+          <a:chExt cx="0" cy="0"/>
+        </a:xfrm>
+      </p:grpSpPr>
+      <p:sp>
+        <p:nvSpPr>
+          <p:cNvPr id="2" name="Slide Image Placeholder 1"/>
+          <p:cNvSpPr>
+            <a:spLocks noGrp="1" noRot="1" noChangeAspect="1"/>
+          </p:cNvSpPr>
+          <p:nvPr>
+            <p:ph type="sldImg"/>
+          </p:nvPr>
+        </p:nvSpPr>
+        <p:spPr/>
+      </p:sp>
+      <p:sp>
+        <p:nvSpPr>
+          <p:cNvPr id="3" name="Notes Placeholder 2"/>
+          <p:cNvSpPr>
+            <a:spLocks noGrp="1"/>
+          </p:cNvSpPr>
+          <p:nvPr>
+            <p:ph type="body" idx="1"/>
+          </p:nvPr>
+        </p:nvSpPr>
+        <p:spPr/>
+        <p:txBody>
+          <a:bodyPr/>
+          <a:lstStyle/>
+          <a:p>
+            <a:endParaRPr lang="en-IN" dirty="0"/>
+          </a:p>
+        </p:txBody>
+      </p:sp>
+      <p:sp>
+        <p:nvSpPr>
+          <p:cNvPr id="4" name="Slide Number Placeholder 3"/>
+          <p:cNvSpPr>
+            <a:spLocks noGrp="1"/>
+          </p:cNvSpPr>
+          <p:nvPr>
+            <p:ph type="sldNum" sz="quarter" idx="5"/>
+          </p:nvPr>
+        </p:nvSpPr>
+        <p:spPr/>
+        <p:txBody>
+          <a:bodyPr/>
+          <a:lstStyle/>
+          <a:p>
+            <a:fld id="{FDC9E0E7-D79D-4812-B544-30E430059E4A}" type="slidenum">
+              <a:rPr lang="en-IN" smtClean="0"/>
+              <a:t>3</a:t>
+            </a:fld>
+            <a:endParaRPr lang="en-IN"/>
+          </a:p>
+        </p:txBody>
+      </p:sp>
+    </p:spTree>
+    <p:extLst>
+      <p:ext uri="{BB962C8B-B14F-4D97-AF65-F5344CB8AC3E}">
+        <p14:creationId xmlns:p14="http://schemas.microsoft.com/office/powerpoint/2010/main" val="3722503285"/>
+      </p:ext>
+    </p:extLst>
+  </p:cSld>
+  <p:clrMapOvr>
+    <a:masterClrMapping/>
+  </p:clrMapOvr>
+</p:notes>
 </file>
 
 <file path=ppt/slideLayouts/slideLayout1.xml><?xml version="1.0" encoding="utf-8"?>
@@ -3370,20 +3814,424 @@
         </p:blipFill>
         <p:spPr>
           <a:xfrm>
-            <a:off x="-1" y="34182"/>
-            <a:ext cx="12850762" cy="6209232"/>
+            <a:off x="-9832" y="4685"/>
+            <a:ext cx="12850762" cy="6160141"/>
           </a:xfrm>
           <a:prstGeom prst="rect">
             <a:avLst/>
           </a:prstGeom>
         </p:spPr>
       </p:pic>
-      <p:sp>
-        <p:nvSpPr>
-          <p:cNvPr id="5" name="Rectangle 4">
-            <a:extLst>
-              <a:ext uri="{FF2B5EF4-FFF2-40B4-BE49-F238E27FC236}">
-                <a16:creationId xmlns:a16="http://schemas.microsoft.com/office/drawing/2014/main" id="{030D4062-667E-75B5-E473-864796E2EDFC}"/>
+    </p:spTree>
+    <p:extLst>
+      <p:ext uri="{BB962C8B-B14F-4D97-AF65-F5344CB8AC3E}">
+        <p14:creationId xmlns:p14="http://schemas.microsoft.com/office/powerpoint/2010/main" val="3561532247"/>
+      </p:ext>
+    </p:extLst>
+  </p:cSld>
+  <p:clrMapOvr>
+    <a:masterClrMapping/>
+  </p:clrMapOvr>
+</p:sld>
+</file>
+
+<file path=ppt/slides/slide2.xml><?xml version="1.0" encoding="utf-8"?>
+<p:sld xmlns:a="http://schemas.openxmlformats.org/drawingml/2006/main" xmlns:r="http://schemas.openxmlformats.org/officeDocument/2006/relationships" xmlns:p="http://schemas.openxmlformats.org/presentationml/2006/main">
+  <p:cSld>
+    <p:spTree>
+      <p:nvGrpSpPr>
+        <p:cNvPr id="1" name=""/>
+        <p:cNvGrpSpPr/>
+        <p:nvPr/>
+      </p:nvGrpSpPr>
+      <p:grpSpPr>
+        <a:xfrm>
+          <a:off x="0" y="0"/>
+          <a:ext cx="0" cy="0"/>
+          <a:chOff x="0" y="0"/>
+          <a:chExt cx="0" cy="0"/>
+        </a:xfrm>
+      </p:grpSpPr>
+      <p:grpSp>
+        <p:nvGrpSpPr>
+          <p:cNvPr id="9" name="Group 8">
+            <a:extLst>
+              <a:ext uri="{FF2B5EF4-FFF2-40B4-BE49-F238E27FC236}">
+                <a16:creationId xmlns:a16="http://schemas.microsoft.com/office/drawing/2014/main" id="{1A8E7C3D-441C-C0D2-5627-9854B483385E}"/>
+              </a:ext>
+            </a:extLst>
+          </p:cNvPr>
+          <p:cNvGrpSpPr/>
+          <p:nvPr/>
+        </p:nvGrpSpPr>
+        <p:grpSpPr>
+          <a:xfrm>
+            <a:off x="108155" y="98322"/>
+            <a:ext cx="3657599" cy="324464"/>
+            <a:chOff x="137652" y="6164826"/>
+            <a:chExt cx="3657599" cy="324464"/>
+          </a:xfrm>
+        </p:grpSpPr>
+        <p:sp>
+          <p:nvSpPr>
+            <p:cNvPr id="4" name="Rectangle 3">
+              <a:extLst>
+                <a:ext uri="{FF2B5EF4-FFF2-40B4-BE49-F238E27FC236}">
+                  <a16:creationId xmlns:a16="http://schemas.microsoft.com/office/drawing/2014/main" id="{FCBE2034-B8F2-D72D-0895-6E0B248BB8EB}"/>
+                </a:ext>
+              </a:extLst>
+            </p:cNvPr>
+            <p:cNvSpPr/>
+            <p:nvPr/>
+          </p:nvSpPr>
+          <p:spPr>
+            <a:xfrm>
+              <a:off x="137652" y="6164826"/>
+              <a:ext cx="727587" cy="324464"/>
+            </a:xfrm>
+            <a:prstGeom prst="rect">
+              <a:avLst/>
+            </a:prstGeom>
+            <a:solidFill>
+              <a:srgbClr val="952C3B"/>
+            </a:solidFill>
+            <a:ln>
+              <a:noFill/>
+            </a:ln>
+          </p:spPr>
+          <p:style>
+            <a:lnRef idx="2">
+              <a:schemeClr val="accent1">
+                <a:shade val="50000"/>
+              </a:schemeClr>
+            </a:lnRef>
+            <a:fillRef idx="1">
+              <a:schemeClr val="accent1"/>
+            </a:fillRef>
+            <a:effectRef idx="0">
+              <a:schemeClr val="accent1"/>
+            </a:effectRef>
+            <a:fontRef idx="minor">
+              <a:schemeClr val="lt1"/>
+            </a:fontRef>
+          </p:style>
+          <p:txBody>
+            <a:bodyPr rtlCol="0" anchor="ctr"/>
+            <a:lstStyle/>
+            <a:p>
+              <a:pPr algn="ctr"/>
+              <a:endParaRPr lang="en-IN">
+                <a:solidFill>
+                  <a:srgbClr val="EFEFEF"/>
+                </a:solidFill>
+              </a:endParaRPr>
+            </a:p>
+          </p:txBody>
+        </p:sp>
+        <p:sp>
+          <p:nvSpPr>
+            <p:cNvPr id="5" name="Rectangle 4">
+              <a:extLst>
+                <a:ext uri="{FF2B5EF4-FFF2-40B4-BE49-F238E27FC236}">
+                  <a16:creationId xmlns:a16="http://schemas.microsoft.com/office/drawing/2014/main" id="{64F95B78-87B6-37CE-104B-045BF1DFFBD0}"/>
+                </a:ext>
+              </a:extLst>
+            </p:cNvPr>
+            <p:cNvSpPr/>
+            <p:nvPr/>
+          </p:nvSpPr>
+          <p:spPr>
+            <a:xfrm>
+              <a:off x="865239" y="6164826"/>
+              <a:ext cx="727587" cy="324464"/>
+            </a:xfrm>
+            <a:prstGeom prst="rect">
+              <a:avLst/>
+            </a:prstGeom>
+            <a:solidFill>
+              <a:srgbClr val="CC344E"/>
+            </a:solidFill>
+            <a:ln>
+              <a:noFill/>
+            </a:ln>
+          </p:spPr>
+          <p:style>
+            <a:lnRef idx="2">
+              <a:schemeClr val="accent1">
+                <a:shade val="50000"/>
+              </a:schemeClr>
+            </a:lnRef>
+            <a:fillRef idx="1">
+              <a:schemeClr val="accent1"/>
+            </a:fillRef>
+            <a:effectRef idx="0">
+              <a:schemeClr val="accent1"/>
+            </a:effectRef>
+            <a:fontRef idx="minor">
+              <a:schemeClr val="lt1"/>
+            </a:fontRef>
+          </p:style>
+          <p:txBody>
+            <a:bodyPr rtlCol="0" anchor="ctr"/>
+            <a:lstStyle/>
+            <a:p>
+              <a:pPr algn="ctr"/>
+              <a:endParaRPr lang="en-IN">
+                <a:solidFill>
+                  <a:srgbClr val="EFEFEF"/>
+                </a:solidFill>
+              </a:endParaRPr>
+            </a:p>
+          </p:txBody>
+        </p:sp>
+        <p:sp>
+          <p:nvSpPr>
+            <p:cNvPr id="6" name="Rectangle 5">
+              <a:extLst>
+                <a:ext uri="{FF2B5EF4-FFF2-40B4-BE49-F238E27FC236}">
+                  <a16:creationId xmlns:a16="http://schemas.microsoft.com/office/drawing/2014/main" id="{6F66EF4B-FEA0-2908-4772-F84E90EFD813}"/>
+                </a:ext>
+              </a:extLst>
+            </p:cNvPr>
+            <p:cNvSpPr/>
+            <p:nvPr/>
+          </p:nvSpPr>
+          <p:spPr>
+            <a:xfrm>
+              <a:off x="1602658" y="6164826"/>
+              <a:ext cx="727587" cy="324464"/>
+            </a:xfrm>
+            <a:prstGeom prst="rect">
+              <a:avLst/>
+            </a:prstGeom>
+            <a:solidFill>
+              <a:srgbClr val="EFEFEF"/>
+            </a:solidFill>
+            <a:ln>
+              <a:noFill/>
+            </a:ln>
+          </p:spPr>
+          <p:style>
+            <a:lnRef idx="2">
+              <a:schemeClr val="accent1">
+                <a:shade val="50000"/>
+              </a:schemeClr>
+            </a:lnRef>
+            <a:fillRef idx="1">
+              <a:schemeClr val="accent1"/>
+            </a:fillRef>
+            <a:effectRef idx="0">
+              <a:schemeClr val="accent1"/>
+            </a:effectRef>
+            <a:fontRef idx="minor">
+              <a:schemeClr val="lt1"/>
+            </a:fontRef>
+          </p:style>
+          <p:txBody>
+            <a:bodyPr rtlCol="0" anchor="ctr"/>
+            <a:lstStyle/>
+            <a:p>
+              <a:pPr algn="ctr"/>
+              <a:endParaRPr lang="en-IN">
+                <a:solidFill>
+                  <a:srgbClr val="EFEFEF"/>
+                </a:solidFill>
+              </a:endParaRPr>
+            </a:p>
+          </p:txBody>
+        </p:sp>
+        <p:sp>
+          <p:nvSpPr>
+            <p:cNvPr id="7" name="Rectangle 6">
+              <a:extLst>
+                <a:ext uri="{FF2B5EF4-FFF2-40B4-BE49-F238E27FC236}">
+                  <a16:creationId xmlns:a16="http://schemas.microsoft.com/office/drawing/2014/main" id="{1059FCAA-6400-17AB-01A4-2785881DF353}"/>
+                </a:ext>
+              </a:extLst>
+            </p:cNvPr>
+            <p:cNvSpPr/>
+            <p:nvPr/>
+          </p:nvSpPr>
+          <p:spPr>
+            <a:xfrm>
+              <a:off x="2340077" y="6164826"/>
+              <a:ext cx="727587" cy="324464"/>
+            </a:xfrm>
+            <a:prstGeom prst="rect">
+              <a:avLst/>
+            </a:prstGeom>
+            <a:solidFill>
+              <a:srgbClr val="626262"/>
+            </a:solidFill>
+            <a:ln>
+              <a:noFill/>
+            </a:ln>
+          </p:spPr>
+          <p:style>
+            <a:lnRef idx="2">
+              <a:schemeClr val="accent1">
+                <a:shade val="50000"/>
+              </a:schemeClr>
+            </a:lnRef>
+            <a:fillRef idx="1">
+              <a:schemeClr val="accent1"/>
+            </a:fillRef>
+            <a:effectRef idx="0">
+              <a:schemeClr val="accent1"/>
+            </a:effectRef>
+            <a:fontRef idx="minor">
+              <a:schemeClr val="lt1"/>
+            </a:fontRef>
+          </p:style>
+          <p:txBody>
+            <a:bodyPr rtlCol="0" anchor="ctr"/>
+            <a:lstStyle/>
+            <a:p>
+              <a:pPr algn="ctr"/>
+              <a:endParaRPr lang="en-IN">
+                <a:solidFill>
+                  <a:srgbClr val="EFEFEF"/>
+                </a:solidFill>
+              </a:endParaRPr>
+            </a:p>
+          </p:txBody>
+        </p:sp>
+        <p:sp>
+          <p:nvSpPr>
+            <p:cNvPr id="8" name="Rectangle 7">
+              <a:extLst>
+                <a:ext uri="{FF2B5EF4-FFF2-40B4-BE49-F238E27FC236}">
+                  <a16:creationId xmlns:a16="http://schemas.microsoft.com/office/drawing/2014/main" id="{1E9A42BB-8A7A-2089-E0A5-E6A1A27DEF06}"/>
+                </a:ext>
+              </a:extLst>
+            </p:cNvPr>
+            <p:cNvSpPr/>
+            <p:nvPr/>
+          </p:nvSpPr>
+          <p:spPr>
+            <a:xfrm>
+              <a:off x="3067664" y="6164826"/>
+              <a:ext cx="727587" cy="324464"/>
+            </a:xfrm>
+            <a:prstGeom prst="rect">
+              <a:avLst/>
+            </a:prstGeom>
+            <a:solidFill>
+              <a:srgbClr val="070707"/>
+            </a:solidFill>
+            <a:ln>
+              <a:noFill/>
+            </a:ln>
+          </p:spPr>
+          <p:style>
+            <a:lnRef idx="2">
+              <a:schemeClr val="accent1">
+                <a:shade val="50000"/>
+              </a:schemeClr>
+            </a:lnRef>
+            <a:fillRef idx="1">
+              <a:schemeClr val="accent1"/>
+            </a:fillRef>
+            <a:effectRef idx="0">
+              <a:schemeClr val="accent1"/>
+            </a:effectRef>
+            <a:fontRef idx="minor">
+              <a:schemeClr val="lt1"/>
+            </a:fontRef>
+          </p:style>
+          <p:txBody>
+            <a:bodyPr rtlCol="0" anchor="ctr"/>
+            <a:lstStyle/>
+            <a:p>
+              <a:pPr algn="ctr"/>
+              <a:endParaRPr lang="en-IN">
+                <a:solidFill>
+                  <a:srgbClr val="EFEFEF"/>
+                </a:solidFill>
+              </a:endParaRPr>
+            </a:p>
+          </p:txBody>
+        </p:sp>
+      </p:grpSp>
+    </p:spTree>
+    <p:extLst>
+      <p:ext uri="{BB962C8B-B14F-4D97-AF65-F5344CB8AC3E}">
+        <p14:creationId xmlns:p14="http://schemas.microsoft.com/office/powerpoint/2010/main" val="2297304092"/>
+      </p:ext>
+    </p:extLst>
+  </p:cSld>
+  <p:clrMapOvr>
+    <a:masterClrMapping/>
+  </p:clrMapOvr>
+</p:sld>
+</file>
+
+<file path=ppt/slides/slide3.xml><?xml version="1.0" encoding="utf-8"?>
+<p:sld xmlns:a="http://schemas.openxmlformats.org/drawingml/2006/main" xmlns:r="http://schemas.openxmlformats.org/officeDocument/2006/relationships" xmlns:p="http://schemas.openxmlformats.org/presentationml/2006/main">
+  <p:cSld>
+    <p:spTree>
+      <p:nvGrpSpPr>
+        <p:cNvPr id="1" name=""/>
+        <p:cNvGrpSpPr/>
+        <p:nvPr/>
+      </p:nvGrpSpPr>
+      <p:grpSpPr>
+        <a:xfrm>
+          <a:off x="0" y="0"/>
+          <a:ext cx="0" cy="0"/>
+          <a:chOff x="0" y="0"/>
+          <a:chExt cx="0" cy="0"/>
+        </a:xfrm>
+      </p:grpSpPr>
+      <p:cxnSp>
+        <p:nvCxnSpPr>
+          <p:cNvPr id="3" name="Straight Connector 2">
+            <a:extLst>
+              <a:ext uri="{FF2B5EF4-FFF2-40B4-BE49-F238E27FC236}">
+                <a16:creationId xmlns:a16="http://schemas.microsoft.com/office/drawing/2014/main" id="{B3D34112-00F4-DED1-0269-41405031ABBB}"/>
+              </a:ext>
+            </a:extLst>
+          </p:cNvPr>
+          <p:cNvCxnSpPr>
+            <a:cxnSpLocks/>
+          </p:cNvCxnSpPr>
+          <p:nvPr/>
+        </p:nvCxnSpPr>
+        <p:spPr>
+          <a:xfrm>
+            <a:off x="648929" y="0"/>
+            <a:ext cx="0" cy="6858000"/>
+          </a:xfrm>
+          <a:prstGeom prst="line">
+            <a:avLst/>
+          </a:prstGeom>
+          <a:ln>
+            <a:solidFill>
+              <a:srgbClr val="EFEFEF"/>
+            </a:solidFill>
+          </a:ln>
+        </p:spPr>
+        <p:style>
+          <a:lnRef idx="1">
+            <a:schemeClr val="accent1"/>
+          </a:lnRef>
+          <a:fillRef idx="0">
+            <a:schemeClr val="accent1"/>
+          </a:fillRef>
+          <a:effectRef idx="0">
+            <a:schemeClr val="accent1"/>
+          </a:effectRef>
+          <a:fontRef idx="minor">
+            <a:schemeClr val="tx1"/>
+          </a:fontRef>
+        </p:style>
+      </p:cxnSp>
+      <p:sp>
+        <p:nvSpPr>
+          <p:cNvPr id="6" name="Rectangle 5">
+            <a:extLst>
+              <a:ext uri="{FF2B5EF4-FFF2-40B4-BE49-F238E27FC236}">
+                <a16:creationId xmlns:a16="http://schemas.microsoft.com/office/drawing/2014/main" id="{820F2D7C-AD12-46E0-268D-673FFFAADCED}"/>
               </a:ext>
             </a:extLst>
           </p:cNvPr>
@@ -3392,8 +4240,8 @@
         </p:nvSpPr>
         <p:spPr>
           <a:xfrm>
-            <a:off x="1632155" y="5997677"/>
-            <a:ext cx="1327355" cy="511278"/>
+            <a:off x="648932" y="0"/>
+            <a:ext cx="11543068" cy="658761"/>
           </a:xfrm>
           <a:prstGeom prst="rect">
             <a:avLst/>
@@ -3401,6 +4249,9 @@
           <a:solidFill>
             <a:srgbClr val="952C3B"/>
           </a:solidFill>
+          <a:ln>
+            <a:noFill/>
+          </a:ln>
         </p:spPr>
         <p:style>
           <a:lnRef idx="2">
@@ -3427,10 +4278,239 @@
           </a:p>
         </p:txBody>
       </p:sp>
+      <p:pic>
+        <p:nvPicPr>
+          <p:cNvPr id="8" name="Graphic 7">
+            <a:extLst>
+              <a:ext uri="{FF2B5EF4-FFF2-40B4-BE49-F238E27FC236}">
+                <a16:creationId xmlns:a16="http://schemas.microsoft.com/office/drawing/2014/main" id="{0F72B0D0-F23B-9657-895A-52251EFFA424}"/>
+              </a:ext>
+            </a:extLst>
+          </p:cNvPr>
+          <p:cNvPicPr>
+            <a:picLocks noChangeAspect="1"/>
+          </p:cNvPicPr>
+          <p:nvPr/>
+        </p:nvPicPr>
+        <p:blipFill>
+          <a:blip r:embed="rId3">
+            <a:extLst>
+              <a:ext uri="{28A0092B-C50C-407E-A947-70E740481C1C}">
+                <a14:useLocalDpi xmlns:a14="http://schemas.microsoft.com/office/drawing/2010/main" val="0"/>
+              </a:ext>
+              <a:ext uri="{96DAC541-7B7A-43D3-8B79-37D633B846F1}">
+                <asvg:svgBlip xmlns:asvg="http://schemas.microsoft.com/office/drawing/2016/SVG/main" r:embed="rId4"/>
+              </a:ext>
+            </a:extLst>
+          </a:blip>
+          <a:stretch>
+            <a:fillRect/>
+          </a:stretch>
+        </p:blipFill>
+        <p:spPr>
+          <a:xfrm>
+            <a:off x="845577" y="-13517"/>
+            <a:ext cx="672278" cy="672278"/>
+          </a:xfrm>
+          <a:prstGeom prst="rect">
+            <a:avLst/>
+          </a:prstGeom>
+        </p:spPr>
+      </p:pic>
+      <p:sp>
+        <p:nvSpPr>
+          <p:cNvPr id="10" name="Rectangle 9">
+            <a:extLst>
+              <a:ext uri="{FF2B5EF4-FFF2-40B4-BE49-F238E27FC236}">
+                <a16:creationId xmlns:a16="http://schemas.microsoft.com/office/drawing/2014/main" id="{9061611C-BBB0-4FAB-B5CC-BFD388B7554C}"/>
+              </a:ext>
+            </a:extLst>
+          </p:cNvPr>
+          <p:cNvSpPr/>
+          <p:nvPr/>
+        </p:nvSpPr>
+        <p:spPr>
+          <a:xfrm>
+            <a:off x="648930" y="6548283"/>
+            <a:ext cx="11543071" cy="323233"/>
+          </a:xfrm>
+          <a:prstGeom prst="rect">
+            <a:avLst/>
+          </a:prstGeom>
+          <a:solidFill>
+            <a:srgbClr val="952C3B"/>
+          </a:solidFill>
+          <a:ln>
+            <a:noFill/>
+          </a:ln>
+        </p:spPr>
+        <p:style>
+          <a:lnRef idx="2">
+            <a:schemeClr val="accent1">
+              <a:shade val="50000"/>
+            </a:schemeClr>
+          </a:lnRef>
+          <a:fillRef idx="1">
+            <a:schemeClr val="accent1"/>
+          </a:fillRef>
+          <a:effectRef idx="0">
+            <a:schemeClr val="accent1"/>
+          </a:effectRef>
+          <a:fontRef idx="minor">
+            <a:schemeClr val="lt1"/>
+          </a:fontRef>
+        </p:style>
+        <p:txBody>
+          <a:bodyPr rtlCol="0" anchor="ctr"/>
+          <a:lstStyle/>
+          <a:p>
+            <a:pPr algn="ctr"/>
+            <a:r>
+              <a:rPr lang="en-US" sz="1600" dirty="0">
+                <a:latin typeface="Chiller" panose="04020404031007020602" pitchFamily="82" charset="0"/>
+              </a:rPr>
+              <a:t>Impossible Is Nothing</a:t>
+            </a:r>
+            <a:endParaRPr lang="en-IN" sz="1600" dirty="0">
+              <a:latin typeface="Chiller" panose="04020404031007020602" pitchFamily="82" charset="0"/>
+            </a:endParaRPr>
+          </a:p>
+        </p:txBody>
+      </p:sp>
+      <p:pic>
+        <p:nvPicPr>
+          <p:cNvPr id="11" name="Graphic 10">
+            <a:extLst>
+              <a:ext uri="{FF2B5EF4-FFF2-40B4-BE49-F238E27FC236}">
+                <a16:creationId xmlns:a16="http://schemas.microsoft.com/office/drawing/2014/main" id="{66FC19C8-938C-5BEF-1CB7-D5B73429EE9B}"/>
+              </a:ext>
+            </a:extLst>
+          </p:cNvPr>
+          <p:cNvPicPr>
+            <a:picLocks noChangeAspect="1"/>
+          </p:cNvPicPr>
+          <p:nvPr/>
+        </p:nvPicPr>
+        <p:blipFill>
+          <a:blip r:embed="rId3">
+            <a:extLst>
+              <a:ext uri="{28A0092B-C50C-407E-A947-70E740481C1C}">
+                <a14:useLocalDpi xmlns:a14="http://schemas.microsoft.com/office/drawing/2010/main" val="0"/>
+              </a:ext>
+              <a:ext uri="{96DAC541-7B7A-43D3-8B79-37D633B846F1}">
+                <asvg:svgBlip xmlns:asvg="http://schemas.microsoft.com/office/drawing/2016/SVG/main" r:embed="rId4"/>
+              </a:ext>
+            </a:extLst>
+          </a:blip>
+          <a:stretch>
+            <a:fillRect/>
+          </a:stretch>
+        </p:blipFill>
+        <p:spPr>
+          <a:xfrm>
+            <a:off x="5432325" y="6518792"/>
+            <a:ext cx="339208" cy="339208"/>
+          </a:xfrm>
+          <a:prstGeom prst="rect">
+            <a:avLst/>
+          </a:prstGeom>
+        </p:spPr>
+      </p:pic>
+      <p:pic>
+        <p:nvPicPr>
+          <p:cNvPr id="14" name="Graphic 13">
+            <a:extLst>
+              <a:ext uri="{FF2B5EF4-FFF2-40B4-BE49-F238E27FC236}">
+                <a16:creationId xmlns:a16="http://schemas.microsoft.com/office/drawing/2014/main" id="{6989E602-6A4F-599C-0A5B-1B7BA3ABF487}"/>
+              </a:ext>
+            </a:extLst>
+          </p:cNvPr>
+          <p:cNvPicPr>
+            <a:picLocks noChangeAspect="1"/>
+          </p:cNvPicPr>
+          <p:nvPr/>
+        </p:nvPicPr>
+        <p:blipFill>
+          <a:blip r:embed="rId5">
+            <a:extLst>
+              <a:ext uri="{28A0092B-C50C-407E-A947-70E740481C1C}">
+                <a14:useLocalDpi xmlns:a14="http://schemas.microsoft.com/office/drawing/2010/main" val="0"/>
+              </a:ext>
+              <a:ext uri="{96DAC541-7B7A-43D3-8B79-37D633B846F1}">
+                <asvg:svgBlip xmlns:asvg="http://schemas.microsoft.com/office/drawing/2016/SVG/main" r:embed="rId6"/>
+              </a:ext>
+            </a:extLst>
+          </a:blip>
+          <a:stretch>
+            <a:fillRect/>
+          </a:stretch>
+        </p:blipFill>
+        <p:spPr>
+          <a:xfrm>
+            <a:off x="3706775" y="766938"/>
+            <a:ext cx="5781345" cy="5781345"/>
+          </a:xfrm>
+          <a:prstGeom prst="rect">
+            <a:avLst/>
+          </a:prstGeom>
+        </p:spPr>
+      </p:pic>
+      <p:sp>
+        <p:nvSpPr>
+          <p:cNvPr id="15" name="Rectangle 14">
+            <a:extLst>
+              <a:ext uri="{FF2B5EF4-FFF2-40B4-BE49-F238E27FC236}">
+                <a16:creationId xmlns:a16="http://schemas.microsoft.com/office/drawing/2014/main" id="{E43445B9-7173-0B63-F4AD-047CC2032EBE}"/>
+              </a:ext>
+            </a:extLst>
+          </p:cNvPr>
+          <p:cNvSpPr/>
+          <p:nvPr/>
+        </p:nvSpPr>
+        <p:spPr>
+          <a:xfrm>
+            <a:off x="0" y="0"/>
+            <a:ext cx="648923" cy="6858000"/>
+          </a:xfrm>
+          <a:prstGeom prst="rect">
+            <a:avLst/>
+          </a:prstGeom>
+          <a:solidFill>
+            <a:schemeClr val="bg1"/>
+          </a:solidFill>
+          <a:ln>
+            <a:noFill/>
+          </a:ln>
+        </p:spPr>
+        <p:style>
+          <a:lnRef idx="2">
+            <a:schemeClr val="accent1">
+              <a:shade val="50000"/>
+            </a:schemeClr>
+          </a:lnRef>
+          <a:fillRef idx="1">
+            <a:schemeClr val="accent1"/>
+          </a:fillRef>
+          <a:effectRef idx="0">
+            <a:schemeClr val="accent1"/>
+          </a:effectRef>
+          <a:fontRef idx="minor">
+            <a:schemeClr val="lt1"/>
+          </a:fontRef>
+        </p:style>
+        <p:txBody>
+          <a:bodyPr rtlCol="0" anchor="ctr"/>
+          <a:lstStyle/>
+          <a:p>
+            <a:pPr algn="ctr"/>
+            <a:endParaRPr lang="en-IN"/>
+          </a:p>
+        </p:txBody>
+      </p:sp>
     </p:spTree>
     <p:extLst>
       <p:ext uri="{BB962C8B-B14F-4D97-AF65-F5344CB8AC3E}">
-        <p14:creationId xmlns:p14="http://schemas.microsoft.com/office/powerpoint/2010/main" val="3561532247"/>
+        <p14:creationId xmlns:p14="http://schemas.microsoft.com/office/powerpoint/2010/main" val="2671380133"/>
       </p:ext>
     </p:extLst>
   </p:cSld>
@@ -3733,4 +4813,299 @@
     </a:ext>
   </a:extLst>
 </a:theme>
+</file>
+
+<file path=ppt/theme/theme2.xml><?xml version="1.0" encoding="utf-8"?>
+<a:theme xmlns:a="http://schemas.openxmlformats.org/drawingml/2006/main" name="Office Theme">
+  <a:themeElements>
+    <a:clrScheme name="Office">
+      <a:dk1>
+        <a:sysClr val="windowText" lastClr="000000"/>
+      </a:dk1>
+      <a:lt1>
+        <a:sysClr val="window" lastClr="FFFFFF"/>
+      </a:lt1>
+      <a:dk2>
+        <a:srgbClr val="44546A"/>
+      </a:dk2>
+      <a:lt2>
+        <a:srgbClr val="E7E6E6"/>
+      </a:lt2>
+      <a:accent1>
+        <a:srgbClr val="4472C4"/>
+      </a:accent1>
+      <a:accent2>
+        <a:srgbClr val="ED7D31"/>
+      </a:accent2>
+      <a:accent3>
+        <a:srgbClr val="A5A5A5"/>
+      </a:accent3>
+      <a:accent4>
+        <a:srgbClr val="FFC000"/>
+      </a:accent4>
+      <a:accent5>
+        <a:srgbClr val="5B9BD5"/>
+      </a:accent5>
+      <a:accent6>
+        <a:srgbClr val="70AD47"/>
+      </a:accent6>
+      <a:hlink>
+        <a:srgbClr val="0563C1"/>
+      </a:hlink>
+      <a:folHlink>
+        <a:srgbClr val="954F72"/>
+      </a:folHlink>
+    </a:clrScheme>
+    <a:fontScheme name="Office">
+      <a:majorFont>
+        <a:latin typeface="Calibri Light" panose="020F0302020204030204"/>
+        <a:ea typeface=""/>
+        <a:cs typeface=""/>
+        <a:font script="Jpan" typeface="游ゴシック Light"/>
+        <a:font script="Hang" typeface="맑은 고딕"/>
+        <a:font script="Hans" typeface="等线 Light"/>
+        <a:font script="Hant" typeface="新細明體"/>
+        <a:font script="Arab" typeface="Times New Roman"/>
+        <a:font script="Hebr" typeface="Times New Roman"/>
+        <a:font script="Thai" typeface="Angsana New"/>
+        <a:font script="Ethi" typeface="Nyala"/>
+        <a:font script="Beng" typeface="Vrinda"/>
+        <a:font script="Gujr" typeface="Shruti"/>
+        <a:font script="Khmr" typeface="MoolBoran"/>
+        <a:font script="Knda" typeface="Tunga"/>
+        <a:font script="Guru" typeface="Raavi"/>
+        <a:font script="Cans" typeface="Euphemia"/>
+        <a:font script="Cher" typeface="Plantagenet Cherokee"/>
+        <a:font script="Yiii" typeface="Microsoft Yi Baiti"/>
+        <a:font script="Tibt" typeface="Microsoft Himalaya"/>
+        <a:font script="Thaa" typeface="MV Boli"/>
+        <a:font script="Deva" typeface="Mangal"/>
+        <a:font script="Telu" typeface="Gautami"/>
+        <a:font script="Taml" typeface="Latha"/>
+        <a:font script="Syrc" typeface="Estrangelo Edessa"/>
+        <a:font script="Orya" typeface="Kalinga"/>
+        <a:font script="Mlym" typeface="Kartika"/>
+        <a:font script="Laoo" typeface="DokChampa"/>
+        <a:font script="Sinh" typeface="Iskoola Pota"/>
+        <a:font script="Mong" typeface="Mongolian Baiti"/>
+        <a:font script="Viet" typeface="Times New Roman"/>
+        <a:font script="Uigh" typeface="Microsoft Uighur"/>
+        <a:font script="Geor" typeface="Sylfaen"/>
+        <a:font script="Armn" typeface="Arial"/>
+        <a:font script="Bugi" typeface="Leelawadee UI"/>
+        <a:font script="Bopo" typeface="Microsoft JhengHei"/>
+        <a:font script="Java" typeface="Javanese Text"/>
+        <a:font script="Lisu" typeface="Segoe UI"/>
+        <a:font script="Mymr" typeface="Myanmar Text"/>
+        <a:font script="Nkoo" typeface="Ebrima"/>
+        <a:font script="Olck" typeface="Nirmala UI"/>
+        <a:font script="Osma" typeface="Ebrima"/>
+        <a:font script="Phag" typeface="Phagspa"/>
+        <a:font script="Syrn" typeface="Estrangelo Edessa"/>
+        <a:font script="Syrj" typeface="Estrangelo Edessa"/>
+        <a:font script="Syre" typeface="Estrangelo Edessa"/>
+        <a:font script="Sora" typeface="Nirmala UI"/>
+        <a:font script="Tale" typeface="Microsoft Tai Le"/>
+        <a:font script="Talu" typeface="Microsoft New Tai Lue"/>
+        <a:font script="Tfng" typeface="Ebrima"/>
+      </a:majorFont>
+      <a:minorFont>
+        <a:latin typeface="Calibri" panose="020F0502020204030204"/>
+        <a:ea typeface=""/>
+        <a:cs typeface=""/>
+        <a:font script="Jpan" typeface="游ゴシック"/>
+        <a:font script="Hang" typeface="맑은 고딕"/>
+        <a:font script="Hans" typeface="等线"/>
+        <a:font script="Hant" typeface="新細明體"/>
+        <a:font script="Arab" typeface="Arial"/>
+        <a:font script="Hebr" typeface="Arial"/>
+        <a:font script="Thai" typeface="Cordia New"/>
+        <a:font script="Ethi" typeface="Nyala"/>
+        <a:font script="Beng" typeface="Vrinda"/>
+        <a:font script="Gujr" typeface="Shruti"/>
+        <a:font script="Khmr" typeface="DaunPenh"/>
+        <a:font script="Knda" typeface="Tunga"/>
+        <a:font script="Guru" typeface="Raavi"/>
+        <a:font script="Cans" typeface="Euphemia"/>
+        <a:font script="Cher" typeface="Plantagenet Cherokee"/>
+        <a:font script="Yiii" typeface="Microsoft Yi Baiti"/>
+        <a:font script="Tibt" typeface="Microsoft Himalaya"/>
+        <a:font script="Thaa" typeface="MV Boli"/>
+        <a:font script="Deva" typeface="Mangal"/>
+        <a:font script="Telu" typeface="Gautami"/>
+        <a:font script="Taml" typeface="Latha"/>
+        <a:font script="Syrc" typeface="Estrangelo Edessa"/>
+        <a:font script="Orya" typeface="Kalinga"/>
+        <a:font script="Mlym" typeface="Kartika"/>
+        <a:font script="Laoo" typeface="DokChampa"/>
+        <a:font script="Sinh" typeface="Iskoola Pota"/>
+        <a:font script="Mong" typeface="Mongolian Baiti"/>
+        <a:font script="Viet" typeface="Arial"/>
+        <a:font script="Uigh" typeface="Microsoft Uighur"/>
+        <a:font script="Geor" typeface="Sylfaen"/>
+        <a:font script="Armn" typeface="Arial"/>
+        <a:font script="Bugi" typeface="Leelawadee UI"/>
+        <a:font script="Bopo" typeface="Microsoft JhengHei"/>
+        <a:font script="Java" typeface="Javanese Text"/>
+        <a:font script="Lisu" typeface="Segoe UI"/>
+        <a:font script="Mymr" typeface="Myanmar Text"/>
+        <a:font script="Nkoo" typeface="Ebrima"/>
+        <a:font script="Olck" typeface="Nirmala UI"/>
+        <a:font script="Osma" typeface="Ebrima"/>
+        <a:font script="Phag" typeface="Phagspa"/>
+        <a:font script="Syrn" typeface="Estrangelo Edessa"/>
+        <a:font script="Syrj" typeface="Estrangelo Edessa"/>
+        <a:font script="Syre" typeface="Estrangelo Edessa"/>
+        <a:font script="Sora" typeface="Nirmala UI"/>
+        <a:font script="Tale" typeface="Microsoft Tai Le"/>
+        <a:font script="Talu" typeface="Microsoft New Tai Lue"/>
+        <a:font script="Tfng" typeface="Ebrima"/>
+      </a:minorFont>
+    </a:fontScheme>
+    <a:fmtScheme name="Office">
+      <a:fillStyleLst>
+        <a:solidFill>
+          <a:schemeClr val="phClr"/>
+        </a:solidFill>
+        <a:gradFill rotWithShape="1">
+          <a:gsLst>
+            <a:gs pos="0">
+              <a:schemeClr val="phClr">
+                <a:lumMod val="110000"/>
+                <a:satMod val="105000"/>
+                <a:tint val="67000"/>
+              </a:schemeClr>
+            </a:gs>
+            <a:gs pos="50000">
+              <a:schemeClr val="phClr">
+                <a:lumMod val="105000"/>
+                <a:satMod val="103000"/>
+                <a:tint val="73000"/>
+              </a:schemeClr>
+            </a:gs>
+            <a:gs pos="100000">
+              <a:schemeClr val="phClr">
+                <a:lumMod val="105000"/>
+                <a:satMod val="109000"/>
+                <a:tint val="81000"/>
+              </a:schemeClr>
+            </a:gs>
+          </a:gsLst>
+          <a:lin ang="5400000" scaled="0"/>
+        </a:gradFill>
+        <a:gradFill rotWithShape="1">
+          <a:gsLst>
+            <a:gs pos="0">
+              <a:schemeClr val="phClr">
+                <a:satMod val="103000"/>
+                <a:lumMod val="102000"/>
+                <a:tint val="94000"/>
+              </a:schemeClr>
+            </a:gs>
+            <a:gs pos="50000">
+              <a:schemeClr val="phClr">
+                <a:satMod val="110000"/>
+                <a:lumMod val="100000"/>
+                <a:shade val="100000"/>
+              </a:schemeClr>
+            </a:gs>
+            <a:gs pos="100000">
+              <a:schemeClr val="phClr">
+                <a:lumMod val="99000"/>
+                <a:satMod val="120000"/>
+                <a:shade val="78000"/>
+              </a:schemeClr>
+            </a:gs>
+          </a:gsLst>
+          <a:lin ang="5400000" scaled="0"/>
+        </a:gradFill>
+      </a:fillStyleLst>
+      <a:lnStyleLst>
+        <a:ln w="6350" cap="flat" cmpd="sng" algn="ctr">
+          <a:solidFill>
+            <a:schemeClr val="phClr"/>
+          </a:solidFill>
+          <a:prstDash val="solid"/>
+          <a:miter lim="800000"/>
+        </a:ln>
+        <a:ln w="12700" cap="flat" cmpd="sng" algn="ctr">
+          <a:solidFill>
+            <a:schemeClr val="phClr"/>
+          </a:solidFill>
+          <a:prstDash val="solid"/>
+          <a:miter lim="800000"/>
+        </a:ln>
+        <a:ln w="19050" cap="flat" cmpd="sng" algn="ctr">
+          <a:solidFill>
+            <a:schemeClr val="phClr"/>
+          </a:solidFill>
+          <a:prstDash val="solid"/>
+          <a:miter lim="800000"/>
+        </a:ln>
+      </a:lnStyleLst>
+      <a:effectStyleLst>
+        <a:effectStyle>
+          <a:effectLst/>
+        </a:effectStyle>
+        <a:effectStyle>
+          <a:effectLst/>
+        </a:effectStyle>
+        <a:effectStyle>
+          <a:effectLst>
+            <a:outerShdw blurRad="57150" dist="19050" dir="5400000" algn="ctr" rotWithShape="0">
+              <a:srgbClr val="000000">
+                <a:alpha val="63000"/>
+              </a:srgbClr>
+            </a:outerShdw>
+          </a:effectLst>
+        </a:effectStyle>
+      </a:effectStyleLst>
+      <a:bgFillStyleLst>
+        <a:solidFill>
+          <a:schemeClr val="phClr"/>
+        </a:solidFill>
+        <a:solidFill>
+          <a:schemeClr val="phClr">
+            <a:tint val="95000"/>
+            <a:satMod val="170000"/>
+          </a:schemeClr>
+        </a:solidFill>
+        <a:gradFill rotWithShape="1">
+          <a:gsLst>
+            <a:gs pos="0">
+              <a:schemeClr val="phClr">
+                <a:tint val="93000"/>
+                <a:satMod val="150000"/>
+                <a:shade val="98000"/>
+                <a:lumMod val="102000"/>
+              </a:schemeClr>
+            </a:gs>
+            <a:gs pos="50000">
+              <a:schemeClr val="phClr">
+                <a:tint val="98000"/>
+                <a:satMod val="130000"/>
+                <a:shade val="90000"/>
+                <a:lumMod val="103000"/>
+              </a:schemeClr>
+            </a:gs>
+            <a:gs pos="100000">
+              <a:schemeClr val="phClr">
+                <a:shade val="63000"/>
+                <a:satMod val="120000"/>
+              </a:schemeClr>
+            </a:gs>
+          </a:gsLst>
+          <a:lin ang="5400000" scaled="0"/>
+        </a:gradFill>
+      </a:bgFillStyleLst>
+    </a:fmtScheme>
+  </a:themeElements>
+  <a:objectDefaults/>
+  <a:extraClrSchemeLst/>
+  <a:extLst>
+    <a:ext uri="{05A4C25C-085E-4340-85A3-A5531E510DB2}">
+      <thm15:themeFamily xmlns:thm15="http://schemas.microsoft.com/office/thememl/2012/main" name="Office Theme" id="{62F939B6-93AF-4DB8-9C6B-D6C7DFDC589F}" vid="{4A3C46E8-61CC-4603-A589-7422A47A8E4A}"/>
+    </a:ext>
+  </a:extLst>
+</a:theme>
 </file>
</xml_diff>

<commit_message>
Modified Data and Created Card Visual
</commit_message>
<xml_diff>
--- a/Power_BI_Project_Assignments/Adidas_Sales_Analytics/Design.pptx
+++ b/Power_BI_Project_Assignments/Adidas_Sales_Analytics/Design.pptx
@@ -199,7 +199,7 @@
           <a:p>
             <a:fld id="{31D7446F-E600-456D-B628-BDA5524B69E8}" type="datetimeFigureOut">
               <a:rPr lang="en-IN" smtClean="0"/>
-              <a:t>09-11-2022</a:t>
+              <a:t>12-11-2022</a:t>
             </a:fld>
             <a:endParaRPr lang="en-IN"/>
           </a:p>
@@ -700,7 +700,7 @@
           <a:p>
             <a:fld id="{7C10B4CC-7E1F-4AA5-B67E-5DEAD4BA08CC}" type="datetimeFigureOut">
               <a:rPr lang="en-IN" smtClean="0"/>
-              <a:t>09-11-2022</a:t>
+              <a:t>12-11-2022</a:t>
             </a:fld>
             <a:endParaRPr lang="en-IN"/>
           </a:p>
@@ -900,7 +900,7 @@
           <a:p>
             <a:fld id="{7C10B4CC-7E1F-4AA5-B67E-5DEAD4BA08CC}" type="datetimeFigureOut">
               <a:rPr lang="en-IN" smtClean="0"/>
-              <a:t>09-11-2022</a:t>
+              <a:t>12-11-2022</a:t>
             </a:fld>
             <a:endParaRPr lang="en-IN"/>
           </a:p>
@@ -1110,7 +1110,7 @@
           <a:p>
             <a:fld id="{7C10B4CC-7E1F-4AA5-B67E-5DEAD4BA08CC}" type="datetimeFigureOut">
               <a:rPr lang="en-IN" smtClean="0"/>
-              <a:t>09-11-2022</a:t>
+              <a:t>12-11-2022</a:t>
             </a:fld>
             <a:endParaRPr lang="en-IN"/>
           </a:p>
@@ -1310,7 +1310,7 @@
           <a:p>
             <a:fld id="{7C10B4CC-7E1F-4AA5-B67E-5DEAD4BA08CC}" type="datetimeFigureOut">
               <a:rPr lang="en-IN" smtClean="0"/>
-              <a:t>09-11-2022</a:t>
+              <a:t>12-11-2022</a:t>
             </a:fld>
             <a:endParaRPr lang="en-IN"/>
           </a:p>
@@ -1586,7 +1586,7 @@
           <a:p>
             <a:fld id="{7C10B4CC-7E1F-4AA5-B67E-5DEAD4BA08CC}" type="datetimeFigureOut">
               <a:rPr lang="en-IN" smtClean="0"/>
-              <a:t>09-11-2022</a:t>
+              <a:t>12-11-2022</a:t>
             </a:fld>
             <a:endParaRPr lang="en-IN"/>
           </a:p>
@@ -1854,7 +1854,7 @@
           <a:p>
             <a:fld id="{7C10B4CC-7E1F-4AA5-B67E-5DEAD4BA08CC}" type="datetimeFigureOut">
               <a:rPr lang="en-IN" smtClean="0"/>
-              <a:t>09-11-2022</a:t>
+              <a:t>12-11-2022</a:t>
             </a:fld>
             <a:endParaRPr lang="en-IN"/>
           </a:p>
@@ -2269,7 +2269,7 @@
           <a:p>
             <a:fld id="{7C10B4CC-7E1F-4AA5-B67E-5DEAD4BA08CC}" type="datetimeFigureOut">
               <a:rPr lang="en-IN" smtClean="0"/>
-              <a:t>09-11-2022</a:t>
+              <a:t>12-11-2022</a:t>
             </a:fld>
             <a:endParaRPr lang="en-IN"/>
           </a:p>
@@ -2411,7 +2411,7 @@
           <a:p>
             <a:fld id="{7C10B4CC-7E1F-4AA5-B67E-5DEAD4BA08CC}" type="datetimeFigureOut">
               <a:rPr lang="en-IN" smtClean="0"/>
-              <a:t>09-11-2022</a:t>
+              <a:t>12-11-2022</a:t>
             </a:fld>
             <a:endParaRPr lang="en-IN"/>
           </a:p>
@@ -2524,7 +2524,7 @@
           <a:p>
             <a:fld id="{7C10B4CC-7E1F-4AA5-B67E-5DEAD4BA08CC}" type="datetimeFigureOut">
               <a:rPr lang="en-IN" smtClean="0"/>
-              <a:t>09-11-2022</a:t>
+              <a:t>12-11-2022</a:t>
             </a:fld>
             <a:endParaRPr lang="en-IN"/>
           </a:p>
@@ -2837,7 +2837,7 @@
           <a:p>
             <a:fld id="{7C10B4CC-7E1F-4AA5-B67E-5DEAD4BA08CC}" type="datetimeFigureOut">
               <a:rPr lang="en-IN" smtClean="0"/>
-              <a:t>09-11-2022</a:t>
+              <a:t>12-11-2022</a:t>
             </a:fld>
             <a:endParaRPr lang="en-IN"/>
           </a:p>
@@ -3126,7 +3126,7 @@
           <a:p>
             <a:fld id="{7C10B4CC-7E1F-4AA5-B67E-5DEAD4BA08CC}" type="datetimeFigureOut">
               <a:rPr lang="en-IN" smtClean="0"/>
-              <a:t>09-11-2022</a:t>
+              <a:t>12-11-2022</a:t>
             </a:fld>
             <a:endParaRPr lang="en-IN"/>
           </a:p>
@@ -3369,7 +3369,7 @@
           <a:p>
             <a:fld id="{7C10B4CC-7E1F-4AA5-B67E-5DEAD4BA08CC}" type="datetimeFigureOut">
               <a:rPr lang="en-IN" smtClean="0"/>
-              <a:t>09-11-2022</a:t>
+              <a:t>12-11-2022</a:t>
             </a:fld>
             <a:endParaRPr lang="en-IN"/>
           </a:p>
@@ -4149,6 +4149,185 @@
                   <a:srgbClr val="EFEFEF"/>
                 </a:solidFill>
               </a:endParaRPr>
+            </a:p>
+          </p:txBody>
+        </p:sp>
+      </p:grpSp>
+      <p:grpSp>
+        <p:nvGrpSpPr>
+          <p:cNvPr id="15" name="Group 14">
+            <a:extLst>
+              <a:ext uri="{FF2B5EF4-FFF2-40B4-BE49-F238E27FC236}">
+                <a16:creationId xmlns:a16="http://schemas.microsoft.com/office/drawing/2014/main" id="{8C1C33B9-14C4-C0E6-B205-9037A1DF666F}"/>
+              </a:ext>
+            </a:extLst>
+          </p:cNvPr>
+          <p:cNvGrpSpPr/>
+          <p:nvPr/>
+        </p:nvGrpSpPr>
+        <p:grpSpPr>
+          <a:xfrm>
+            <a:off x="742336" y="1445342"/>
+            <a:ext cx="2182761" cy="855407"/>
+            <a:chOff x="742336" y="1445342"/>
+            <a:chExt cx="2182761" cy="855407"/>
+          </a:xfrm>
+        </p:grpSpPr>
+        <p:sp>
+          <p:nvSpPr>
+            <p:cNvPr id="13" name="Rectangle 12">
+              <a:extLst>
+                <a:ext uri="{FF2B5EF4-FFF2-40B4-BE49-F238E27FC236}">
+                  <a16:creationId xmlns:a16="http://schemas.microsoft.com/office/drawing/2014/main" id="{4C940413-5974-95E4-A2C1-005BC8EDE319}"/>
+                </a:ext>
+              </a:extLst>
+            </p:cNvPr>
+            <p:cNvSpPr/>
+            <p:nvPr/>
+          </p:nvSpPr>
+          <p:spPr>
+            <a:xfrm>
+              <a:off x="835743" y="1445342"/>
+              <a:ext cx="1995948" cy="45719"/>
+            </a:xfrm>
+            <a:prstGeom prst="rect">
+              <a:avLst/>
+            </a:prstGeom>
+            <a:solidFill>
+              <a:srgbClr val="952C3B"/>
+            </a:solidFill>
+            <a:ln>
+              <a:solidFill>
+                <a:srgbClr val="952C3B"/>
+              </a:solidFill>
+            </a:ln>
+          </p:spPr>
+          <p:style>
+            <a:lnRef idx="2">
+              <a:schemeClr val="accent1">
+                <a:shade val="50000"/>
+              </a:schemeClr>
+            </a:lnRef>
+            <a:fillRef idx="1">
+              <a:schemeClr val="accent1"/>
+            </a:fillRef>
+            <a:effectRef idx="0">
+              <a:schemeClr val="accent1"/>
+            </a:effectRef>
+            <a:fontRef idx="minor">
+              <a:schemeClr val="lt1"/>
+            </a:fontRef>
+          </p:style>
+          <p:txBody>
+            <a:bodyPr rtlCol="0" anchor="ctr"/>
+            <a:lstStyle/>
+            <a:p>
+              <a:pPr algn="ctr"/>
+              <a:endParaRPr lang="en-IN"/>
+            </a:p>
+          </p:txBody>
+        </p:sp>
+        <p:sp>
+          <p:nvSpPr>
+            <p:cNvPr id="3" name="Rectangle: Rounded Corners 2">
+              <a:extLst>
+                <a:ext uri="{FF2B5EF4-FFF2-40B4-BE49-F238E27FC236}">
+                  <a16:creationId xmlns:a16="http://schemas.microsoft.com/office/drawing/2014/main" id="{A7498ACD-CF79-C0A4-A4A7-93480EF86A6D}"/>
+                </a:ext>
+              </a:extLst>
+            </p:cNvPr>
+            <p:cNvSpPr/>
+            <p:nvPr/>
+          </p:nvSpPr>
+          <p:spPr>
+            <a:xfrm>
+              <a:off x="742336" y="1445343"/>
+              <a:ext cx="2182761" cy="855406"/>
+            </a:xfrm>
+            <a:prstGeom prst="roundRect">
+              <a:avLst/>
+            </a:prstGeom>
+            <a:noFill/>
+            <a:ln>
+              <a:noFill/>
+            </a:ln>
+          </p:spPr>
+          <p:style>
+            <a:lnRef idx="2">
+              <a:schemeClr val="accent1">
+                <a:shade val="50000"/>
+              </a:schemeClr>
+            </a:lnRef>
+            <a:fillRef idx="1">
+              <a:schemeClr val="accent1"/>
+            </a:fillRef>
+            <a:effectRef idx="0">
+              <a:schemeClr val="accent1"/>
+            </a:effectRef>
+            <a:fontRef idx="minor">
+              <a:schemeClr val="lt1"/>
+            </a:fontRef>
+          </p:style>
+          <p:txBody>
+            <a:bodyPr rtlCol="0" anchor="ctr"/>
+            <a:lstStyle/>
+            <a:p>
+              <a:pPr algn="ctr"/>
+              <a:endParaRPr lang="en-IN"/>
+            </a:p>
+          </p:txBody>
+        </p:sp>
+        <p:sp>
+          <p:nvSpPr>
+            <p:cNvPr id="14" name="Rectangle 13">
+              <a:extLst>
+                <a:ext uri="{FF2B5EF4-FFF2-40B4-BE49-F238E27FC236}">
+                  <a16:creationId xmlns:a16="http://schemas.microsoft.com/office/drawing/2014/main" id="{0820C8B5-AF94-3AFE-71B0-B8FB9D07748B}"/>
+                </a:ext>
+              </a:extLst>
+            </p:cNvPr>
+            <p:cNvSpPr/>
+            <p:nvPr/>
+          </p:nvSpPr>
+          <p:spPr>
+            <a:xfrm>
+              <a:off x="835743" y="2255030"/>
+              <a:ext cx="1995948" cy="45719"/>
+            </a:xfrm>
+            <a:prstGeom prst="rect">
+              <a:avLst/>
+            </a:prstGeom>
+            <a:solidFill>
+              <a:srgbClr val="952C3B"/>
+            </a:solidFill>
+            <a:ln>
+              <a:solidFill>
+                <a:srgbClr val="952C3B"/>
+              </a:solidFill>
+            </a:ln>
+          </p:spPr>
+          <p:style>
+            <a:lnRef idx="2">
+              <a:schemeClr val="accent1">
+                <a:shade val="50000"/>
+              </a:schemeClr>
+            </a:lnRef>
+            <a:fillRef idx="1">
+              <a:schemeClr val="accent1"/>
+            </a:fillRef>
+            <a:effectRef idx="0">
+              <a:schemeClr val="accent1"/>
+            </a:effectRef>
+            <a:fontRef idx="minor">
+              <a:schemeClr val="lt1"/>
+            </a:fontRef>
+          </p:style>
+          <p:txBody>
+            <a:bodyPr rtlCol="0" anchor="ctr"/>
+            <a:lstStyle/>
+            <a:p>
+              <a:pPr algn="ctr"/>
+              <a:endParaRPr lang="en-IN"/>
             </a:p>
           </p:txBody>
         </p:sp>

</xml_diff>